<commit_message>
Update Tutorial 5 Presentation.pptx
</commit_message>
<xml_diff>
--- a/Tutorial 5 Iterative Methods/Tutorial 5 Presentation.pptx
+++ b/Tutorial 5 Iterative Methods/Tutorial 5 Presentation.pptx
@@ -5,10 +5,10 @@
     <p:sldMasterId id="2147483648" r:id="rId4"/>
   </p:sldMasterIdLst>
   <p:notesMasterIdLst>
-    <p:notesMasterId r:id="rId19"/>
+    <p:notesMasterId r:id="rId18"/>
   </p:notesMasterIdLst>
   <p:handoutMasterIdLst>
-    <p:handoutMasterId r:id="rId20"/>
+    <p:handoutMasterId r:id="rId19"/>
   </p:handoutMasterIdLst>
   <p:sldIdLst>
     <p:sldId id="256" r:id="rId5"/>
@@ -16,15 +16,14 @@
     <p:sldId id="260" r:id="rId7"/>
     <p:sldId id="261" r:id="rId8"/>
     <p:sldId id="262" r:id="rId9"/>
-    <p:sldId id="263" r:id="rId10"/>
-    <p:sldId id="266" r:id="rId11"/>
-    <p:sldId id="267" r:id="rId12"/>
-    <p:sldId id="268" r:id="rId13"/>
-    <p:sldId id="269" r:id="rId14"/>
-    <p:sldId id="270" r:id="rId15"/>
-    <p:sldId id="271" r:id="rId16"/>
-    <p:sldId id="264" r:id="rId17"/>
-    <p:sldId id="265" r:id="rId18"/>
+    <p:sldId id="266" r:id="rId10"/>
+    <p:sldId id="267" r:id="rId11"/>
+    <p:sldId id="268" r:id="rId12"/>
+    <p:sldId id="269" r:id="rId13"/>
+    <p:sldId id="270" r:id="rId14"/>
+    <p:sldId id="271" r:id="rId15"/>
+    <p:sldId id="264" r:id="rId16"/>
+    <p:sldId id="265" r:id="rId17"/>
   </p:sldIdLst>
   <p:sldSz cx="12192000" cy="6858000"/>
   <p:notesSz cx="6858000" cy="9144000"/>
@@ -3803,7 +3802,7 @@
           <p:cNvPr id="2" name="Title 1">
             <a:extLst>
               <a:ext uri="{FF2B5EF4-FFF2-40B4-BE49-F238E27FC236}">
-                <a16:creationId xmlns:a16="http://schemas.microsoft.com/office/drawing/2014/main" id="{8F8736DF-F3C3-423B-B1C2-695F27986E61}"/>
+                <a16:creationId xmlns:a16="http://schemas.microsoft.com/office/drawing/2014/main" id="{037C434F-78E8-49C1-AC09-0B2CABEA34BA}"/>
               </a:ext>
             </a:extLst>
           </p:cNvPr>
@@ -3821,7 +3820,7 @@
           <a:p>
             <a:r>
               <a:rPr lang="en-AU" dirty="0"/>
-              <a:t>Determining the step function</a:t>
+              <a:t>Notes on step function</a:t>
             </a:r>
           </a:p>
         </p:txBody>
@@ -3831,7 +3830,7 @@
           <p:cNvPr id="3" name="Content Placeholder 2">
             <a:extLst>
               <a:ext uri="{FF2B5EF4-FFF2-40B4-BE49-F238E27FC236}">
-                <a16:creationId xmlns:a16="http://schemas.microsoft.com/office/drawing/2014/main" id="{7AF4B6BA-CDA6-44A1-AB45-2BF634981CB3}"/>
+                <a16:creationId xmlns:a16="http://schemas.microsoft.com/office/drawing/2014/main" id="{BA271C65-D345-42D7-9DC8-587C1503FB6A}"/>
               </a:ext>
             </a:extLst>
           </p:cNvPr>
@@ -3850,7 +3849,19 @@
             <a:pPr marL="0" indent="0">
               <a:buNone/>
             </a:pPr>
-            <a:endParaRPr lang="en-AU" dirty="0"/>
+            <a:r>
+              <a:rPr lang="en-AU" dirty="0"/>
+              <a:t>Obviously this is more accurate at small timesteps (delta t)!</a:t>
+            </a:r>
+          </a:p>
+          <a:p>
+            <a:pPr marL="0" indent="0">
+              <a:buNone/>
+            </a:pPr>
+            <a:r>
+              <a:rPr lang="en-AU" dirty="0"/>
+              <a:t>There are better numerical approximations of derivatives out there, I have used the simplest one. </a:t>
+            </a:r>
           </a:p>
           <a:p>
             <a:pPr marL="0" indent="0">
@@ -3858,177 +3869,12 @@
             </a:pPr>
             <a:endParaRPr lang="en-AU" dirty="0"/>
           </a:p>
-          <a:p>
-            <a:pPr marL="0" indent="0">
-              <a:buNone/>
-            </a:pPr>
-            <a:r>
-              <a:rPr lang="en-AU" dirty="0"/>
-              <a:t>Let’s do a first order, finite-difference approximation of the derivative:</a:t>
-            </a:r>
-          </a:p>
-          <a:p>
-            <a:pPr marL="0" indent="0">
-              <a:buNone/>
-            </a:pPr>
-            <a:endParaRPr lang="en-AU" dirty="0"/>
-          </a:p>
-          <a:p>
-            <a:pPr marL="0" indent="0">
-              <a:buNone/>
-            </a:pPr>
-            <a:endParaRPr lang="en-AU" dirty="0"/>
-          </a:p>
-          <a:p>
-            <a:pPr marL="0" indent="0">
-              <a:buNone/>
-            </a:pPr>
-            <a:r>
-              <a:rPr lang="en-AU" dirty="0"/>
-              <a:t>Which we can then extend:</a:t>
-            </a:r>
-          </a:p>
-          <a:p>
-            <a:pPr marL="0" indent="0">
-              <a:buNone/>
-            </a:pPr>
-            <a:endParaRPr lang="en-AU" dirty="0"/>
-          </a:p>
-          <a:p>
-            <a:pPr marL="0" indent="0">
-              <a:buNone/>
-            </a:pPr>
-            <a:r>
-              <a:rPr lang="en-AU" dirty="0"/>
-              <a:t>And we get our step-function! </a:t>
-            </a:r>
-          </a:p>
-        </p:txBody>
-      </p:sp>
-      <p:pic>
-        <p:nvPicPr>
-          <p:cNvPr id="4" name="Picture 3">
-            <a:extLst>
-              <a:ext uri="{FF2B5EF4-FFF2-40B4-BE49-F238E27FC236}">
-                <a16:creationId xmlns:a16="http://schemas.microsoft.com/office/drawing/2014/main" id="{1AA36A05-ECA4-472F-AA1A-BAC234782C16}"/>
-              </a:ext>
-            </a:extLst>
-          </p:cNvPr>
-          <p:cNvPicPr>
-            <a:picLocks noChangeAspect="1"/>
-          </p:cNvPicPr>
-          <p:nvPr/>
-        </p:nvPicPr>
-        <p:blipFill>
-          <a:blip r:embed="rId2"/>
-          <a:stretch>
-            <a:fillRect/>
-          </a:stretch>
-        </p:blipFill>
-        <p:spPr>
-          <a:xfrm>
-            <a:off x="4871864" y="1620433"/>
-            <a:ext cx="1944216" cy="864096"/>
-          </a:xfrm>
-          <a:prstGeom prst="rect">
-            <a:avLst/>
-          </a:prstGeom>
-        </p:spPr>
-      </p:pic>
-      <p:pic>
-        <p:nvPicPr>
-          <p:cNvPr id="5" name="Picture 4">
-            <a:extLst>
-              <a:ext uri="{FF2B5EF4-FFF2-40B4-BE49-F238E27FC236}">
-                <a16:creationId xmlns:a16="http://schemas.microsoft.com/office/drawing/2014/main" id="{07CB1277-FCB9-4504-8432-A7B41CB1CBED}"/>
-              </a:ext>
-            </a:extLst>
-          </p:cNvPr>
-          <p:cNvPicPr>
-            <a:picLocks noChangeAspect="1"/>
-          </p:cNvPicPr>
-          <p:nvPr/>
-        </p:nvPicPr>
-        <p:blipFill>
-          <a:blip r:embed="rId3"/>
-          <a:stretch>
-            <a:fillRect/>
-          </a:stretch>
-        </p:blipFill>
-        <p:spPr>
-          <a:xfrm>
-            <a:off x="4548572" y="3284984"/>
-            <a:ext cx="2590800" cy="723900"/>
-          </a:xfrm>
-          <a:prstGeom prst="rect">
-            <a:avLst/>
-          </a:prstGeom>
-        </p:spPr>
-      </p:pic>
-      <p:pic>
-        <p:nvPicPr>
-          <p:cNvPr id="6" name="Picture 5">
-            <a:extLst>
-              <a:ext uri="{FF2B5EF4-FFF2-40B4-BE49-F238E27FC236}">
-                <a16:creationId xmlns:a16="http://schemas.microsoft.com/office/drawing/2014/main" id="{20D0CC69-E831-4AC7-90B5-6EFC5572C06F}"/>
-              </a:ext>
-            </a:extLst>
-          </p:cNvPr>
-          <p:cNvPicPr>
-            <a:picLocks noChangeAspect="1"/>
-          </p:cNvPicPr>
-          <p:nvPr/>
-        </p:nvPicPr>
-        <p:blipFill>
-          <a:blip r:embed="rId4"/>
-          <a:stretch>
-            <a:fillRect/>
-          </a:stretch>
-        </p:blipFill>
-        <p:spPr>
-          <a:xfrm>
-            <a:off x="4024697" y="4735485"/>
-            <a:ext cx="3638550" cy="590550"/>
-          </a:xfrm>
-          <a:prstGeom prst="rect">
-            <a:avLst/>
-          </a:prstGeom>
-        </p:spPr>
-      </p:pic>
-      <p:pic>
-        <p:nvPicPr>
-          <p:cNvPr id="7" name="Picture 6">
-            <a:extLst>
-              <a:ext uri="{FF2B5EF4-FFF2-40B4-BE49-F238E27FC236}">
-                <a16:creationId xmlns:a16="http://schemas.microsoft.com/office/drawing/2014/main" id="{57F1D75B-EC12-47A3-A650-FEF6B58747AC}"/>
-              </a:ext>
-            </a:extLst>
-          </p:cNvPr>
-          <p:cNvPicPr>
-            <a:picLocks noChangeAspect="1"/>
-          </p:cNvPicPr>
-          <p:nvPr/>
-        </p:nvPicPr>
-        <p:blipFill>
-          <a:blip r:embed="rId5"/>
-          <a:stretch>
-            <a:fillRect/>
-          </a:stretch>
-        </p:blipFill>
-        <p:spPr>
-          <a:xfrm>
-            <a:off x="4295800" y="5857875"/>
-            <a:ext cx="3276600" cy="542925"/>
-          </a:xfrm>
-          <a:prstGeom prst="rect">
-            <a:avLst/>
-          </a:prstGeom>
-        </p:spPr>
-      </p:pic>
+        </p:txBody>
+      </p:sp>
     </p:spTree>
     <p:extLst>
       <p:ext uri="{BB962C8B-B14F-4D97-AF65-F5344CB8AC3E}">
-        <p14:creationId xmlns:p14="http://schemas.microsoft.com/office/powerpoint/2010/main" val="51208511"/>
+        <p14:creationId xmlns:p14="http://schemas.microsoft.com/office/powerpoint/2010/main" val="3413653316"/>
       </p:ext>
     </p:extLst>
   </p:cSld>
@@ -4060,110 +3906,6 @@
           <p:cNvPr id="2" name="Title 1">
             <a:extLst>
               <a:ext uri="{FF2B5EF4-FFF2-40B4-BE49-F238E27FC236}">
-                <a16:creationId xmlns:a16="http://schemas.microsoft.com/office/drawing/2014/main" id="{037C434F-78E8-49C1-AC09-0B2CABEA34BA}"/>
-              </a:ext>
-            </a:extLst>
-          </p:cNvPr>
-          <p:cNvSpPr>
-            <a:spLocks noGrp="1"/>
-          </p:cNvSpPr>
-          <p:nvPr>
-            <p:ph type="title"/>
-          </p:nvPr>
-        </p:nvSpPr>
-        <p:spPr/>
-        <p:txBody>
-          <a:bodyPr/>
-          <a:lstStyle/>
-          <a:p>
-            <a:r>
-              <a:rPr lang="en-AU" dirty="0"/>
-              <a:t>Notes on step function</a:t>
-            </a:r>
-          </a:p>
-        </p:txBody>
-      </p:sp>
-      <p:sp>
-        <p:nvSpPr>
-          <p:cNvPr id="3" name="Content Placeholder 2">
-            <a:extLst>
-              <a:ext uri="{FF2B5EF4-FFF2-40B4-BE49-F238E27FC236}">
-                <a16:creationId xmlns:a16="http://schemas.microsoft.com/office/drawing/2014/main" id="{BA271C65-D345-42D7-9DC8-587C1503FB6A}"/>
-              </a:ext>
-            </a:extLst>
-          </p:cNvPr>
-          <p:cNvSpPr>
-            <a:spLocks noGrp="1"/>
-          </p:cNvSpPr>
-          <p:nvPr>
-            <p:ph idx="1"/>
-          </p:nvPr>
-        </p:nvSpPr>
-        <p:spPr/>
-        <p:txBody>
-          <a:bodyPr/>
-          <a:lstStyle/>
-          <a:p>
-            <a:pPr marL="0" indent="0">
-              <a:buNone/>
-            </a:pPr>
-            <a:r>
-              <a:rPr lang="en-AU" dirty="0"/>
-              <a:t>Obviously this is more accurate at small timesteps (delta t)!</a:t>
-            </a:r>
-          </a:p>
-          <a:p>
-            <a:pPr marL="0" indent="0">
-              <a:buNone/>
-            </a:pPr>
-            <a:r>
-              <a:rPr lang="en-AU" dirty="0"/>
-              <a:t>There are better numerical approximations of derivatives out there, I have used the simplest one. </a:t>
-            </a:r>
-          </a:p>
-          <a:p>
-            <a:pPr marL="0" indent="0">
-              <a:buNone/>
-            </a:pPr>
-            <a:endParaRPr lang="en-AU" dirty="0"/>
-          </a:p>
-        </p:txBody>
-      </p:sp>
-    </p:spTree>
-    <p:extLst>
-      <p:ext uri="{BB962C8B-B14F-4D97-AF65-F5344CB8AC3E}">
-        <p14:creationId xmlns:p14="http://schemas.microsoft.com/office/powerpoint/2010/main" val="3413653316"/>
-      </p:ext>
-    </p:extLst>
-  </p:cSld>
-  <p:clrMapOvr>
-    <a:masterClrMapping/>
-  </p:clrMapOvr>
-</p:sld>
-</file>
-
-<file path=ppt/slides/slide12.xml><?xml version="1.0" encoding="utf-8"?>
-<p:sld xmlns:a="http://schemas.openxmlformats.org/drawingml/2006/main" xmlns:r="http://schemas.openxmlformats.org/officeDocument/2006/relationships" xmlns:p="http://schemas.openxmlformats.org/presentationml/2006/main">
-  <p:cSld>
-    <p:spTree>
-      <p:nvGrpSpPr>
-        <p:cNvPr id="1" name=""/>
-        <p:cNvGrpSpPr/>
-        <p:nvPr/>
-      </p:nvGrpSpPr>
-      <p:grpSpPr>
-        <a:xfrm>
-          <a:off x="0" y="0"/>
-          <a:ext cx="0" cy="0"/>
-          <a:chOff x="0" y="0"/>
-          <a:chExt cx="0" cy="0"/>
-        </a:xfrm>
-      </p:grpSpPr>
-      <p:sp>
-        <p:nvSpPr>
-          <p:cNvPr id="2" name="Title 1">
-            <a:extLst>
-              <a:ext uri="{FF2B5EF4-FFF2-40B4-BE49-F238E27FC236}">
                 <a16:creationId xmlns:a16="http://schemas.microsoft.com/office/drawing/2014/main" id="{AC43E6E9-1BA2-48A3-B275-D7317DC88D05}"/>
               </a:ext>
             </a:extLst>
@@ -4246,7 +3988,7 @@
 </p:sld>
 </file>
 
-<file path=ppt/slides/slide13.xml><?xml version="1.0" encoding="utf-8"?>
+<file path=ppt/slides/slide12.xml><?xml version="1.0" encoding="utf-8"?>
 <p:sld xmlns:a="http://schemas.openxmlformats.org/drawingml/2006/main" xmlns:r="http://schemas.openxmlformats.org/officeDocument/2006/relationships" xmlns:p="http://schemas.openxmlformats.org/presentationml/2006/main">
   <p:cSld>
     <p:spTree>
@@ -4423,7 +4165,7 @@
 </p:sld>
 </file>
 
-<file path=ppt/slides/slide14.xml><?xml version="1.0" encoding="utf-8"?>
+<file path=ppt/slides/slide13.xml><?xml version="1.0" encoding="utf-8"?>
 <p:sld xmlns:a="http://schemas.openxmlformats.org/drawingml/2006/main" xmlns:r="http://schemas.openxmlformats.org/officeDocument/2006/relationships" xmlns:p="http://schemas.openxmlformats.org/presentationml/2006/main">
   <p:cSld>
     <p:spTree>
@@ -5323,7 +5065,149 @@
           <a:bodyPr/>
           <a:lstStyle/>
           <a:p>
-            <a:endParaRPr lang="en-AU"/>
+            <a:pPr marL="0" indent="0">
+              <a:buNone/>
+            </a:pPr>
+            <a:r>
+              <a:rPr lang="en-AU" dirty="0"/>
+              <a:t>These loops allow us to repeat a computation a set number of times.</a:t>
+            </a:r>
+          </a:p>
+          <a:p>
+            <a:pPr marL="0" indent="0">
+              <a:buNone/>
+            </a:pPr>
+            <a:endParaRPr lang="en-AU" dirty="0"/>
+          </a:p>
+        </p:txBody>
+      </p:sp>
+      <p:pic>
+        <p:nvPicPr>
+          <p:cNvPr id="4" name="Picture 3">
+            <a:extLst>
+              <a:ext uri="{FF2B5EF4-FFF2-40B4-BE49-F238E27FC236}">
+                <a16:creationId xmlns:a16="http://schemas.microsoft.com/office/drawing/2014/main" id="{A492CD3C-3FCB-4B11-9020-9DE5FDF49E62}"/>
+              </a:ext>
+            </a:extLst>
+          </p:cNvPr>
+          <p:cNvPicPr>
+            <a:picLocks noChangeAspect="1"/>
+          </p:cNvPicPr>
+          <p:nvPr/>
+        </p:nvPicPr>
+        <p:blipFill>
+          <a:blip r:embed="rId2"/>
+          <a:stretch>
+            <a:fillRect/>
+          </a:stretch>
+        </p:blipFill>
+        <p:spPr>
+          <a:xfrm>
+            <a:off x="7248128" y="3400552"/>
+            <a:ext cx="2448272" cy="1828648"/>
+          </a:xfrm>
+          <a:prstGeom prst="rect">
+            <a:avLst/>
+          </a:prstGeom>
+        </p:spPr>
+      </p:pic>
+      <p:pic>
+        <p:nvPicPr>
+          <p:cNvPr id="5" name="Picture 4">
+            <a:extLst>
+              <a:ext uri="{FF2B5EF4-FFF2-40B4-BE49-F238E27FC236}">
+                <a16:creationId xmlns:a16="http://schemas.microsoft.com/office/drawing/2014/main" id="{C42381B5-05C1-4FC3-AD52-108E36817E90}"/>
+              </a:ext>
+            </a:extLst>
+          </p:cNvPr>
+          <p:cNvPicPr>
+            <a:picLocks noChangeAspect="1"/>
+          </p:cNvPicPr>
+          <p:nvPr/>
+        </p:nvPicPr>
+        <p:blipFill>
+          <a:blip r:embed="rId3"/>
+          <a:stretch>
+            <a:fillRect/>
+          </a:stretch>
+        </p:blipFill>
+        <p:spPr>
+          <a:xfrm>
+            <a:off x="1703512" y="3314328"/>
+            <a:ext cx="3942438" cy="1296144"/>
+          </a:xfrm>
+          <a:prstGeom prst="rect">
+            <a:avLst/>
+          </a:prstGeom>
+        </p:spPr>
+      </p:pic>
+      <p:sp>
+        <p:nvSpPr>
+          <p:cNvPr id="6" name="TextBox 5">
+            <a:extLst>
+              <a:ext uri="{FF2B5EF4-FFF2-40B4-BE49-F238E27FC236}">
+                <a16:creationId xmlns:a16="http://schemas.microsoft.com/office/drawing/2014/main" id="{EEA4A193-7F98-43D4-B732-506C7ADC158A}"/>
+              </a:ext>
+            </a:extLst>
+          </p:cNvPr>
+          <p:cNvSpPr txBox="1"/>
+          <p:nvPr/>
+        </p:nvSpPr>
+        <p:spPr>
+          <a:xfrm>
+            <a:off x="1703512" y="2553697"/>
+            <a:ext cx="3528392" cy="646331"/>
+          </a:xfrm>
+          <a:prstGeom prst="rect">
+            <a:avLst/>
+          </a:prstGeom>
+          <a:noFill/>
+        </p:spPr>
+        <p:txBody>
+          <a:bodyPr wrap="square" rtlCol="0">
+            <a:spAutoFit/>
+          </a:bodyPr>
+          <a:lstStyle/>
+          <a:p>
+            <a:r>
+              <a:rPr lang="en-AU" dirty="0"/>
+              <a:t>For loops allow us to do things a certain number of times</a:t>
+            </a:r>
+          </a:p>
+        </p:txBody>
+      </p:sp>
+      <p:sp>
+        <p:nvSpPr>
+          <p:cNvPr id="7" name="TextBox 6">
+            <a:extLst>
+              <a:ext uri="{FF2B5EF4-FFF2-40B4-BE49-F238E27FC236}">
+                <a16:creationId xmlns:a16="http://schemas.microsoft.com/office/drawing/2014/main" id="{94FE3B96-D776-424B-8A80-A978595DCCD1}"/>
+              </a:ext>
+            </a:extLst>
+          </p:cNvPr>
+          <p:cNvSpPr txBox="1"/>
+          <p:nvPr/>
+        </p:nvSpPr>
+        <p:spPr>
+          <a:xfrm>
+            <a:off x="6816080" y="2564904"/>
+            <a:ext cx="3528392" cy="646331"/>
+          </a:xfrm>
+          <a:prstGeom prst="rect">
+            <a:avLst/>
+          </a:prstGeom>
+          <a:noFill/>
+        </p:spPr>
+        <p:txBody>
+          <a:bodyPr wrap="square" rtlCol="0">
+            <a:spAutoFit/>
+          </a:bodyPr>
+          <a:lstStyle/>
+          <a:p>
+            <a:r>
+              <a:rPr lang="en-AU" dirty="0"/>
+              <a:t>While loops allow will keep going while something is true</a:t>
+            </a:r>
           </a:p>
         </p:txBody>
       </p:sp>
@@ -5406,10 +5290,100 @@
           <a:bodyPr/>
           <a:lstStyle/>
           <a:p>
-            <a:endParaRPr lang="en-AU"/>
-          </a:p>
-        </p:txBody>
-      </p:sp>
+            <a:pPr marL="0" indent="0">
+              <a:buNone/>
+            </a:pPr>
+            <a:r>
+              <a:rPr lang="en-AU" dirty="0"/>
+              <a:t>Instead of simply repeating a calculation, we can iterate through time/space to make evolving calculations. Usually this involves each calculation using the data from a previous calculation.</a:t>
+            </a:r>
+          </a:p>
+          <a:p>
+            <a:pPr marL="0" indent="0">
+              <a:buNone/>
+            </a:pPr>
+            <a:r>
+              <a:rPr lang="en-AU" dirty="0" err="1"/>
+              <a:t>Eg</a:t>
+            </a:r>
+            <a:r>
+              <a:rPr lang="en-AU" dirty="0"/>
+              <a:t>, </a:t>
+            </a:r>
+            <a:r>
+              <a:rPr lang="en-AU" dirty="0" err="1"/>
+              <a:t>fibbonaci</a:t>
+            </a:r>
+            <a:r>
+              <a:rPr lang="en-AU" dirty="0"/>
+              <a:t> sequence;</a:t>
+            </a:r>
+          </a:p>
+          <a:p>
+            <a:pPr marL="0" indent="0">
+              <a:buNone/>
+            </a:pPr>
+            <a:endParaRPr lang="en-AU" dirty="0"/>
+          </a:p>
+          <a:p>
+            <a:pPr marL="0" indent="0">
+              <a:buNone/>
+            </a:pPr>
+            <a:endParaRPr lang="en-AU" dirty="0"/>
+          </a:p>
+          <a:p>
+            <a:pPr marL="0" indent="0">
+              <a:buNone/>
+            </a:pPr>
+            <a:endParaRPr lang="en-AU" dirty="0"/>
+          </a:p>
+          <a:p>
+            <a:pPr marL="0" indent="0">
+              <a:buNone/>
+            </a:pPr>
+            <a:r>
+              <a:rPr lang="en-AU" dirty="0"/>
+              <a:t>The most common way to do this is for time-evolving systems, where the current state depends slightly on the previous state.</a:t>
+            </a:r>
+          </a:p>
+          <a:p>
+            <a:pPr marL="0" indent="0">
+              <a:buNone/>
+            </a:pPr>
+            <a:endParaRPr lang="en-AU" dirty="0"/>
+          </a:p>
+        </p:txBody>
+      </p:sp>
+      <p:pic>
+        <p:nvPicPr>
+          <p:cNvPr id="4" name="Picture 3">
+            <a:extLst>
+              <a:ext uri="{FF2B5EF4-FFF2-40B4-BE49-F238E27FC236}">
+                <a16:creationId xmlns:a16="http://schemas.microsoft.com/office/drawing/2014/main" id="{8B321CD0-48DD-4926-B57A-FAC89AAFC3BA}"/>
+              </a:ext>
+            </a:extLst>
+          </p:cNvPr>
+          <p:cNvPicPr>
+            <a:picLocks noChangeAspect="1"/>
+          </p:cNvPicPr>
+          <p:nvPr/>
+        </p:nvPicPr>
+        <p:blipFill>
+          <a:blip r:embed="rId2"/>
+          <a:stretch>
+            <a:fillRect/>
+          </a:stretch>
+        </p:blipFill>
+        <p:spPr>
+          <a:xfrm>
+            <a:off x="3143672" y="3468848"/>
+            <a:ext cx="5734050" cy="1295400"/>
+          </a:xfrm>
+          <a:prstGeom prst="rect">
+            <a:avLst/>
+          </a:prstGeom>
+        </p:spPr>
+      </p:pic>
     </p:spTree>
     <p:extLst>
       <p:ext uri="{BB962C8B-B14F-4D97-AF65-F5344CB8AC3E}">
@@ -5424,89 +5398,6 @@
 </file>
 
 <file path=ppt/slides/slide6.xml><?xml version="1.0" encoding="utf-8"?>
-<p:sld xmlns:a="http://schemas.openxmlformats.org/drawingml/2006/main" xmlns:r="http://schemas.openxmlformats.org/officeDocument/2006/relationships" xmlns:p="http://schemas.openxmlformats.org/presentationml/2006/main">
-  <p:cSld>
-    <p:spTree>
-      <p:nvGrpSpPr>
-        <p:cNvPr id="1" name=""/>
-        <p:cNvGrpSpPr/>
-        <p:nvPr/>
-      </p:nvGrpSpPr>
-      <p:grpSpPr>
-        <a:xfrm>
-          <a:off x="0" y="0"/>
-          <a:ext cx="0" cy="0"/>
-          <a:chOff x="0" y="0"/>
-          <a:chExt cx="0" cy="0"/>
-        </a:xfrm>
-      </p:grpSpPr>
-      <p:sp>
-        <p:nvSpPr>
-          <p:cNvPr id="2" name="Title 1">
-            <a:extLst>
-              <a:ext uri="{FF2B5EF4-FFF2-40B4-BE49-F238E27FC236}">
-                <a16:creationId xmlns:a16="http://schemas.microsoft.com/office/drawing/2014/main" id="{1E60A974-8D8C-4860-944D-DC8957DB0BEC}"/>
-              </a:ext>
-            </a:extLst>
-          </p:cNvPr>
-          <p:cNvSpPr>
-            <a:spLocks noGrp="1"/>
-          </p:cNvSpPr>
-          <p:nvPr>
-            <p:ph type="title"/>
-          </p:nvPr>
-        </p:nvSpPr>
-        <p:spPr/>
-        <p:txBody>
-          <a:bodyPr/>
-          <a:lstStyle/>
-          <a:p>
-            <a:r>
-              <a:rPr lang="en-AU" dirty="0"/>
-              <a:t>Iterating through space</a:t>
-            </a:r>
-          </a:p>
-        </p:txBody>
-      </p:sp>
-      <p:sp>
-        <p:nvSpPr>
-          <p:cNvPr id="3" name="Content Placeholder 2">
-            <a:extLst>
-              <a:ext uri="{FF2B5EF4-FFF2-40B4-BE49-F238E27FC236}">
-                <a16:creationId xmlns:a16="http://schemas.microsoft.com/office/drawing/2014/main" id="{0E4B7E75-C3C1-413F-9691-457063D963F5}"/>
-              </a:ext>
-            </a:extLst>
-          </p:cNvPr>
-          <p:cNvSpPr>
-            <a:spLocks noGrp="1"/>
-          </p:cNvSpPr>
-          <p:nvPr>
-            <p:ph idx="1"/>
-          </p:nvPr>
-        </p:nvSpPr>
-        <p:spPr/>
-        <p:txBody>
-          <a:bodyPr/>
-          <a:lstStyle/>
-          <a:p>
-            <a:endParaRPr lang="en-AU"/>
-          </a:p>
-        </p:txBody>
-      </p:sp>
-    </p:spTree>
-    <p:extLst>
-      <p:ext uri="{BB962C8B-B14F-4D97-AF65-F5344CB8AC3E}">
-        <p14:creationId xmlns:p14="http://schemas.microsoft.com/office/powerpoint/2010/main" val="109146268"/>
-      </p:ext>
-    </p:extLst>
-  </p:cSld>
-  <p:clrMapOvr>
-    <a:masterClrMapping/>
-  </p:clrMapOvr>
-</p:sld>
-</file>
-
-<file path=ppt/slides/slide7.xml><?xml version="1.0" encoding="utf-8"?>
 <p:sld xmlns:a="http://schemas.openxmlformats.org/drawingml/2006/main" xmlns:r="http://schemas.openxmlformats.org/officeDocument/2006/relationships" xmlns:p="http://schemas.openxmlformats.org/presentationml/2006/main">
   <p:cSld>
     <p:spTree>
@@ -5691,7 +5582,7 @@
 </p:sld>
 </file>
 
-<file path=ppt/slides/slide8.xml><?xml version="1.0" encoding="utf-8"?>
+<file path=ppt/slides/slide7.xml><?xml version="1.0" encoding="utf-8"?>
 <p:sld xmlns:a="http://schemas.openxmlformats.org/drawingml/2006/main" xmlns:r="http://schemas.openxmlformats.org/officeDocument/2006/relationships" xmlns:p="http://schemas.openxmlformats.org/presentationml/2006/main">
   <p:cSld>
     <p:spTree>
@@ -5835,7 +5726,7 @@
 </p:sld>
 </file>
 
-<file path=ppt/slides/slide9.xml><?xml version="1.0" encoding="utf-8"?>
+<file path=ppt/slides/slide8.xml><?xml version="1.0" encoding="utf-8"?>
 <p:sld xmlns:a="http://schemas.openxmlformats.org/drawingml/2006/main" xmlns:r="http://schemas.openxmlformats.org/officeDocument/2006/relationships" xmlns:p="http://schemas.openxmlformats.org/presentationml/2006/main">
   <p:cSld>
     <p:spTree>
@@ -6005,6 +5896,263 @@
     <p:extLst>
       <p:ext uri="{BB962C8B-B14F-4D97-AF65-F5344CB8AC3E}">
         <p14:creationId xmlns:p14="http://schemas.microsoft.com/office/powerpoint/2010/main" val="916118528"/>
+      </p:ext>
+    </p:extLst>
+  </p:cSld>
+  <p:clrMapOvr>
+    <a:masterClrMapping/>
+  </p:clrMapOvr>
+</p:sld>
+</file>
+
+<file path=ppt/slides/slide9.xml><?xml version="1.0" encoding="utf-8"?>
+<p:sld xmlns:a="http://schemas.openxmlformats.org/drawingml/2006/main" xmlns:r="http://schemas.openxmlformats.org/officeDocument/2006/relationships" xmlns:p="http://schemas.openxmlformats.org/presentationml/2006/main">
+  <p:cSld>
+    <p:spTree>
+      <p:nvGrpSpPr>
+        <p:cNvPr id="1" name=""/>
+        <p:cNvGrpSpPr/>
+        <p:nvPr/>
+      </p:nvGrpSpPr>
+      <p:grpSpPr>
+        <a:xfrm>
+          <a:off x="0" y="0"/>
+          <a:ext cx="0" cy="0"/>
+          <a:chOff x="0" y="0"/>
+          <a:chExt cx="0" cy="0"/>
+        </a:xfrm>
+      </p:grpSpPr>
+      <p:sp>
+        <p:nvSpPr>
+          <p:cNvPr id="2" name="Title 1">
+            <a:extLst>
+              <a:ext uri="{FF2B5EF4-FFF2-40B4-BE49-F238E27FC236}">
+                <a16:creationId xmlns:a16="http://schemas.microsoft.com/office/drawing/2014/main" id="{8F8736DF-F3C3-423B-B1C2-695F27986E61}"/>
+              </a:ext>
+            </a:extLst>
+          </p:cNvPr>
+          <p:cNvSpPr>
+            <a:spLocks noGrp="1"/>
+          </p:cNvSpPr>
+          <p:nvPr>
+            <p:ph type="title"/>
+          </p:nvPr>
+        </p:nvSpPr>
+        <p:spPr/>
+        <p:txBody>
+          <a:bodyPr/>
+          <a:lstStyle/>
+          <a:p>
+            <a:r>
+              <a:rPr lang="en-AU" dirty="0"/>
+              <a:t>Determining the step function</a:t>
+            </a:r>
+          </a:p>
+        </p:txBody>
+      </p:sp>
+      <p:sp>
+        <p:nvSpPr>
+          <p:cNvPr id="3" name="Content Placeholder 2">
+            <a:extLst>
+              <a:ext uri="{FF2B5EF4-FFF2-40B4-BE49-F238E27FC236}">
+                <a16:creationId xmlns:a16="http://schemas.microsoft.com/office/drawing/2014/main" id="{7AF4B6BA-CDA6-44A1-AB45-2BF634981CB3}"/>
+              </a:ext>
+            </a:extLst>
+          </p:cNvPr>
+          <p:cNvSpPr>
+            <a:spLocks noGrp="1"/>
+          </p:cNvSpPr>
+          <p:nvPr>
+            <p:ph idx="1"/>
+          </p:nvPr>
+        </p:nvSpPr>
+        <p:spPr/>
+        <p:txBody>
+          <a:bodyPr/>
+          <a:lstStyle/>
+          <a:p>
+            <a:pPr marL="0" indent="0">
+              <a:buNone/>
+            </a:pPr>
+            <a:endParaRPr lang="en-AU" dirty="0"/>
+          </a:p>
+          <a:p>
+            <a:pPr marL="0" indent="0">
+              <a:buNone/>
+            </a:pPr>
+            <a:endParaRPr lang="en-AU" dirty="0"/>
+          </a:p>
+          <a:p>
+            <a:pPr marL="0" indent="0">
+              <a:buNone/>
+            </a:pPr>
+            <a:r>
+              <a:rPr lang="en-AU" dirty="0"/>
+              <a:t>Let’s do a first order, finite-difference approximation of the derivative:</a:t>
+            </a:r>
+          </a:p>
+          <a:p>
+            <a:pPr marL="0" indent="0">
+              <a:buNone/>
+            </a:pPr>
+            <a:endParaRPr lang="en-AU" dirty="0"/>
+          </a:p>
+          <a:p>
+            <a:pPr marL="0" indent="0">
+              <a:buNone/>
+            </a:pPr>
+            <a:endParaRPr lang="en-AU" dirty="0"/>
+          </a:p>
+          <a:p>
+            <a:pPr marL="0" indent="0">
+              <a:buNone/>
+            </a:pPr>
+            <a:r>
+              <a:rPr lang="en-AU" dirty="0"/>
+              <a:t>Which we can then extend:</a:t>
+            </a:r>
+          </a:p>
+          <a:p>
+            <a:pPr marL="0" indent="0">
+              <a:buNone/>
+            </a:pPr>
+            <a:endParaRPr lang="en-AU" dirty="0"/>
+          </a:p>
+          <a:p>
+            <a:pPr marL="0" indent="0">
+              <a:buNone/>
+            </a:pPr>
+            <a:r>
+              <a:rPr lang="en-AU" dirty="0"/>
+              <a:t>And we get our step-function! </a:t>
+            </a:r>
+          </a:p>
+        </p:txBody>
+      </p:sp>
+      <p:pic>
+        <p:nvPicPr>
+          <p:cNvPr id="4" name="Picture 3">
+            <a:extLst>
+              <a:ext uri="{FF2B5EF4-FFF2-40B4-BE49-F238E27FC236}">
+                <a16:creationId xmlns:a16="http://schemas.microsoft.com/office/drawing/2014/main" id="{1AA36A05-ECA4-472F-AA1A-BAC234782C16}"/>
+              </a:ext>
+            </a:extLst>
+          </p:cNvPr>
+          <p:cNvPicPr>
+            <a:picLocks noChangeAspect="1"/>
+          </p:cNvPicPr>
+          <p:nvPr/>
+        </p:nvPicPr>
+        <p:blipFill>
+          <a:blip r:embed="rId2"/>
+          <a:stretch>
+            <a:fillRect/>
+          </a:stretch>
+        </p:blipFill>
+        <p:spPr>
+          <a:xfrm>
+            <a:off x="4871864" y="1620433"/>
+            <a:ext cx="1944216" cy="864096"/>
+          </a:xfrm>
+          <a:prstGeom prst="rect">
+            <a:avLst/>
+          </a:prstGeom>
+        </p:spPr>
+      </p:pic>
+      <p:pic>
+        <p:nvPicPr>
+          <p:cNvPr id="5" name="Picture 4">
+            <a:extLst>
+              <a:ext uri="{FF2B5EF4-FFF2-40B4-BE49-F238E27FC236}">
+                <a16:creationId xmlns:a16="http://schemas.microsoft.com/office/drawing/2014/main" id="{07CB1277-FCB9-4504-8432-A7B41CB1CBED}"/>
+              </a:ext>
+            </a:extLst>
+          </p:cNvPr>
+          <p:cNvPicPr>
+            <a:picLocks noChangeAspect="1"/>
+          </p:cNvPicPr>
+          <p:nvPr/>
+        </p:nvPicPr>
+        <p:blipFill>
+          <a:blip r:embed="rId3"/>
+          <a:stretch>
+            <a:fillRect/>
+          </a:stretch>
+        </p:blipFill>
+        <p:spPr>
+          <a:xfrm>
+            <a:off x="4548572" y="3284984"/>
+            <a:ext cx="2590800" cy="723900"/>
+          </a:xfrm>
+          <a:prstGeom prst="rect">
+            <a:avLst/>
+          </a:prstGeom>
+        </p:spPr>
+      </p:pic>
+      <p:pic>
+        <p:nvPicPr>
+          <p:cNvPr id="6" name="Picture 5">
+            <a:extLst>
+              <a:ext uri="{FF2B5EF4-FFF2-40B4-BE49-F238E27FC236}">
+                <a16:creationId xmlns:a16="http://schemas.microsoft.com/office/drawing/2014/main" id="{20D0CC69-E831-4AC7-90B5-6EFC5572C06F}"/>
+              </a:ext>
+            </a:extLst>
+          </p:cNvPr>
+          <p:cNvPicPr>
+            <a:picLocks noChangeAspect="1"/>
+          </p:cNvPicPr>
+          <p:nvPr/>
+        </p:nvPicPr>
+        <p:blipFill>
+          <a:blip r:embed="rId4"/>
+          <a:stretch>
+            <a:fillRect/>
+          </a:stretch>
+        </p:blipFill>
+        <p:spPr>
+          <a:xfrm>
+            <a:off x="4024697" y="4735485"/>
+            <a:ext cx="3638550" cy="590550"/>
+          </a:xfrm>
+          <a:prstGeom prst="rect">
+            <a:avLst/>
+          </a:prstGeom>
+        </p:spPr>
+      </p:pic>
+      <p:pic>
+        <p:nvPicPr>
+          <p:cNvPr id="7" name="Picture 6">
+            <a:extLst>
+              <a:ext uri="{FF2B5EF4-FFF2-40B4-BE49-F238E27FC236}">
+                <a16:creationId xmlns:a16="http://schemas.microsoft.com/office/drawing/2014/main" id="{57F1D75B-EC12-47A3-A650-FEF6B58747AC}"/>
+              </a:ext>
+            </a:extLst>
+          </p:cNvPr>
+          <p:cNvPicPr>
+            <a:picLocks noChangeAspect="1"/>
+          </p:cNvPicPr>
+          <p:nvPr/>
+        </p:nvPicPr>
+        <p:blipFill>
+          <a:blip r:embed="rId5"/>
+          <a:stretch>
+            <a:fillRect/>
+          </a:stretch>
+        </p:blipFill>
+        <p:spPr>
+          <a:xfrm>
+            <a:off x="4295800" y="5857875"/>
+            <a:ext cx="3276600" cy="542925"/>
+          </a:xfrm>
+          <a:prstGeom prst="rect">
+            <a:avLst/>
+          </a:prstGeom>
+        </p:spPr>
+      </p:pic>
+    </p:spTree>
+    <p:extLst>
+      <p:ext uri="{BB962C8B-B14F-4D97-AF65-F5344CB8AC3E}">
+        <p14:creationId xmlns:p14="http://schemas.microsoft.com/office/powerpoint/2010/main" val="51208511"/>
       </p:ext>
     </p:extLst>
   </p:cSld>
@@ -7838,15 +7986,6 @@
 </file>
 
 <file path=customXml/item2.xml><?xml version="1.0" encoding="utf-8"?>
-<?mso-contentType ?>
-<FormTemplates xmlns="http://schemas.microsoft.com/sharepoint/v3/contenttype/forms">
-  <Display>DocumentLibraryForm</Display>
-  <Edit>AssetEditForm</Edit>
-  <New>DocumentLibraryForm</New>
-</FormTemplates>
-</file>
-
-<file path=customXml/item3.xml><?xml version="1.0" encoding="utf-8"?>
 <p:properties xmlns:p="http://schemas.microsoft.com/office/2006/metadata/properties" xmlns:xsi="http://www.w3.org/2001/XMLSchema-instance" xmlns:pc="http://schemas.microsoft.com/office/infopath/2007/PartnerControls">
   <documentManagement>
     <DirectSourceMarket xmlns="4873beb7-5857-4685-be1f-d57550cc96cc" xsi:nil="true"/>
@@ -7972,6 +8111,15 @@
 </p:properties>
 </file>
 
+<file path=customXml/item3.xml><?xml version="1.0" encoding="utf-8"?>
+<?mso-contentType ?>
+<FormTemplates xmlns="http://schemas.microsoft.com/sharepoint/v3/contenttype/forms">
+  <Display>DocumentLibraryForm</Display>
+  <Edit>AssetEditForm</Edit>
+  <New>DocumentLibraryForm</New>
+</FormTemplates>
+</file>
+
 <file path=customXml/itemProps1.xml><?xml version="1.0" encoding="utf-8"?>
 <ds:datastoreItem xmlns:ds="http://schemas.openxmlformats.org/officeDocument/2006/customXml" ds:itemID="{0B5C6E15-39DC-470B-9445-F754B9458020}">
   <ds:schemaRefs>
@@ -7991,14 +8139,6 @@
 </file>
 
 <file path=customXml/itemProps2.xml><?xml version="1.0" encoding="utf-8"?>
-<ds:datastoreItem xmlns:ds="http://schemas.openxmlformats.org/officeDocument/2006/customXml" ds:itemID="{746CFF6F-D9AA-4BC0-911A-0A1356771912}">
-  <ds:schemaRefs>
-    <ds:schemaRef ds:uri="http://schemas.microsoft.com/sharepoint/v3/contenttype/forms"/>
-  </ds:schemaRefs>
-</ds:datastoreItem>
-</file>
-
-<file path=customXml/itemProps3.xml><?xml version="1.0" encoding="utf-8"?>
 <ds:datastoreItem xmlns:ds="http://schemas.openxmlformats.org/officeDocument/2006/customXml" ds:itemID="{04098515-0C12-46CF-BC7C-69B4A13CD5FA}">
   <ds:schemaRefs>
     <ds:schemaRef ds:uri="http://schemas.microsoft.com/office/2006/documentManagement/types"/>
@@ -8012,4 +8152,12 @@
     <ds:schemaRef ds:uri="http://purl.org/dc/dcmitype/"/>
   </ds:schemaRefs>
 </ds:datastoreItem>
+</file>
+
+<file path=customXml/itemProps3.xml><?xml version="1.0" encoding="utf-8"?>
+<ds:datastoreItem xmlns:ds="http://schemas.openxmlformats.org/officeDocument/2006/customXml" ds:itemID="{746CFF6F-D9AA-4BC0-911A-0A1356771912}">
+  <ds:schemaRefs>
+    <ds:schemaRef ds:uri="http://schemas.microsoft.com/sharepoint/v3/contenttype/forms"/>
+  </ds:schemaRefs>
+</ds:datastoreItem>
 </file>
</xml_diff>